<commit_message>
Report: finish most of them. Need regionlets.
</commit_message>
<xml_diff>
--- a/Report/Pipeline.pptx
+++ b/Report/Pipeline.pptx
@@ -106,6 +106,11 @@
       </a:defRPr>
     </a:lvl9pPr>
   </p:defaultTextStyle>
+  <p:extLst>
+    <p:ext uri="{EFAFB233-063F-42B5-8137-9DF3F51BA10A}">
+      <p15:sldGuideLst xmlns:p15="http://schemas.microsoft.com/office/powerpoint/2012/main"/>
+    </p:ext>
+  </p:extLst>
 </p:presentation>
 </file>
 
@@ -240,7 +245,7 @@
           <a:p>
             <a:fld id="{B9A0B6E3-E20F-44E6-9D62-9BEFC88829AA}" type="datetimeFigureOut">
               <a:rPr lang="zh-CN" altLang="en-US" smtClean="0"/>
-              <a:t>2015/12/20</a:t>
+              <a:t>2015/12/21</a:t>
             </a:fld>
             <a:endParaRPr lang="zh-CN" altLang="en-US"/>
           </a:p>
@@ -410,7 +415,7 @@
           <a:p>
             <a:fld id="{B9A0B6E3-E20F-44E6-9D62-9BEFC88829AA}" type="datetimeFigureOut">
               <a:rPr lang="zh-CN" altLang="en-US" smtClean="0"/>
-              <a:t>2015/12/20</a:t>
+              <a:t>2015/12/21</a:t>
             </a:fld>
             <a:endParaRPr lang="zh-CN" altLang="en-US"/>
           </a:p>
@@ -590,7 +595,7 @@
           <a:p>
             <a:fld id="{B9A0B6E3-E20F-44E6-9D62-9BEFC88829AA}" type="datetimeFigureOut">
               <a:rPr lang="zh-CN" altLang="en-US" smtClean="0"/>
-              <a:t>2015/12/20</a:t>
+              <a:t>2015/12/21</a:t>
             </a:fld>
             <a:endParaRPr lang="zh-CN" altLang="en-US"/>
           </a:p>
@@ -760,7 +765,7 @@
           <a:p>
             <a:fld id="{B9A0B6E3-E20F-44E6-9D62-9BEFC88829AA}" type="datetimeFigureOut">
               <a:rPr lang="zh-CN" altLang="en-US" smtClean="0"/>
-              <a:t>2015/12/20</a:t>
+              <a:t>2015/12/21</a:t>
             </a:fld>
             <a:endParaRPr lang="zh-CN" altLang="en-US"/>
           </a:p>
@@ -1006,7 +1011,7 @@
           <a:p>
             <a:fld id="{B9A0B6E3-E20F-44E6-9D62-9BEFC88829AA}" type="datetimeFigureOut">
               <a:rPr lang="zh-CN" altLang="en-US" smtClean="0"/>
-              <a:t>2015/12/20</a:t>
+              <a:t>2015/12/21</a:t>
             </a:fld>
             <a:endParaRPr lang="zh-CN" altLang="en-US"/>
           </a:p>
@@ -1238,7 +1243,7 @@
           <a:p>
             <a:fld id="{B9A0B6E3-E20F-44E6-9D62-9BEFC88829AA}" type="datetimeFigureOut">
               <a:rPr lang="zh-CN" altLang="en-US" smtClean="0"/>
-              <a:t>2015/12/20</a:t>
+              <a:t>2015/12/21</a:t>
             </a:fld>
             <a:endParaRPr lang="zh-CN" altLang="en-US"/>
           </a:p>
@@ -1605,7 +1610,7 @@
           <a:p>
             <a:fld id="{B9A0B6E3-E20F-44E6-9D62-9BEFC88829AA}" type="datetimeFigureOut">
               <a:rPr lang="zh-CN" altLang="en-US" smtClean="0"/>
-              <a:t>2015/12/20</a:t>
+              <a:t>2015/12/21</a:t>
             </a:fld>
             <a:endParaRPr lang="zh-CN" altLang="en-US"/>
           </a:p>
@@ -1723,7 +1728,7 @@
           <a:p>
             <a:fld id="{B9A0B6E3-E20F-44E6-9D62-9BEFC88829AA}" type="datetimeFigureOut">
               <a:rPr lang="zh-CN" altLang="en-US" smtClean="0"/>
-              <a:t>2015/12/20</a:t>
+              <a:t>2015/12/21</a:t>
             </a:fld>
             <a:endParaRPr lang="zh-CN" altLang="en-US"/>
           </a:p>
@@ -1818,7 +1823,7 @@
           <a:p>
             <a:fld id="{B9A0B6E3-E20F-44E6-9D62-9BEFC88829AA}" type="datetimeFigureOut">
               <a:rPr lang="zh-CN" altLang="en-US" smtClean="0"/>
-              <a:t>2015/12/20</a:t>
+              <a:t>2015/12/21</a:t>
             </a:fld>
             <a:endParaRPr lang="zh-CN" altLang="en-US"/>
           </a:p>
@@ -2095,7 +2100,7 @@
           <a:p>
             <a:fld id="{B9A0B6E3-E20F-44E6-9D62-9BEFC88829AA}" type="datetimeFigureOut">
               <a:rPr lang="zh-CN" altLang="en-US" smtClean="0"/>
-              <a:t>2015/12/20</a:t>
+              <a:t>2015/12/21</a:t>
             </a:fld>
             <a:endParaRPr lang="zh-CN" altLang="en-US"/>
           </a:p>
@@ -2348,7 +2353,7 @@
           <a:p>
             <a:fld id="{B9A0B6E3-E20F-44E6-9D62-9BEFC88829AA}" type="datetimeFigureOut">
               <a:rPr lang="zh-CN" altLang="en-US" smtClean="0"/>
-              <a:t>2015/12/20</a:t>
+              <a:t>2015/12/21</a:t>
             </a:fld>
             <a:endParaRPr lang="zh-CN" altLang="en-US"/>
           </a:p>
@@ -2561,7 +2566,7 @@
           <a:p>
             <a:fld id="{B9A0B6E3-E20F-44E6-9D62-9BEFC88829AA}" type="datetimeFigureOut">
               <a:rPr lang="zh-CN" altLang="en-US" smtClean="0"/>
-              <a:t>2015/12/20</a:t>
+              <a:t>2015/12/21</a:t>
             </a:fld>
             <a:endParaRPr lang="zh-CN" altLang="en-US"/>
           </a:p>
@@ -4780,6 +4785,37 @@
           </a:p>
         </p:txBody>
       </p:sp>
+      <p:sp>
+        <p:nvSpPr>
+          <p:cNvPr id="15" name="文本框 14"/>
+          <p:cNvSpPr txBox="1"/>
+          <p:nvPr/>
+        </p:nvSpPr>
+        <p:spPr>
+          <a:xfrm>
+            <a:off x="4864562" y="2569618"/>
+            <a:ext cx="2560105" cy="523220"/>
+          </a:xfrm>
+          <a:prstGeom prst="rect">
+            <a:avLst/>
+          </a:prstGeom>
+          <a:noFill/>
+        </p:spPr>
+        <p:txBody>
+          <a:bodyPr wrap="square" rtlCol="0">
+            <a:spAutoFit/>
+          </a:bodyPr>
+          <a:lstStyle/>
+          <a:p>
+            <a:pPr algn="ctr"/>
+            <a:r>
+              <a:rPr lang="en-US" altLang="zh-CN" sz="2800" dirty="0" smtClean="0"/>
+              <a:t>Extract Features</a:t>
+            </a:r>
+            <a:endParaRPr lang="zh-CN" altLang="en-US" sz="2000" dirty="0"/>
+          </a:p>
+        </p:txBody>
+      </p:sp>
     </p:spTree>
     <p:extLst>
       <p:ext uri="{BB962C8B-B14F-4D97-AF65-F5344CB8AC3E}">

</xml_diff>